<commit_message>
add to reinforcement learning
</commit_message>
<xml_diff>
--- a/Presentations/AI - Reinforcement Learning.pptx
+++ b/Presentations/AI - Reinforcement Learning.pptx
@@ -5,7 +5,7 @@
     <p:sldMasterId id="2147483648" r:id="rId1"/>
   </p:sldMasterIdLst>
   <p:notesMasterIdLst>
-    <p:notesMasterId r:id="rId8"/>
+    <p:notesMasterId r:id="rId9"/>
   </p:notesMasterIdLst>
   <p:sldIdLst>
     <p:sldId id="256" r:id="rId2"/>
@@ -14,6 +14,7 @@
     <p:sldId id="282" r:id="rId5"/>
     <p:sldId id="284" r:id="rId6"/>
     <p:sldId id="285" r:id="rId7"/>
+    <p:sldId id="286" r:id="rId8"/>
   </p:sldIdLst>
   <p:sldSz cx="9144000" cy="6858000" type="screen4x3"/>
   <p:notesSz cx="6858000" cy="9144000"/>
@@ -463,6 +464,90 @@
     </a:lvl9pPr>
   </p:notesStyle>
 </p:notesMaster>
+</file>
+
+<file path=ppt/notesSlides/notesSlide1.xml><?xml version="1.0" encoding="utf-8"?>
+<p:notes xmlns:a="http://schemas.openxmlformats.org/drawingml/2006/main" xmlns:r="http://schemas.openxmlformats.org/officeDocument/2006/relationships" xmlns:p="http://schemas.openxmlformats.org/presentationml/2006/main">
+  <p:cSld>
+    <p:spTree>
+      <p:nvGrpSpPr>
+        <p:cNvPr id="1" name=""/>
+        <p:cNvGrpSpPr/>
+        <p:nvPr/>
+      </p:nvGrpSpPr>
+      <p:grpSpPr>
+        <a:xfrm>
+          <a:off x="0" y="0"/>
+          <a:ext cx="0" cy="0"/>
+          <a:chOff x="0" y="0"/>
+          <a:chExt cx="0" cy="0"/>
+        </a:xfrm>
+      </p:grpSpPr>
+      <p:sp>
+        <p:nvSpPr>
+          <p:cNvPr id="2" name="Slide Image Placeholder 1"/>
+          <p:cNvSpPr>
+            <a:spLocks noGrp="1" noRot="1" noChangeAspect="1"/>
+          </p:cNvSpPr>
+          <p:nvPr>
+            <p:ph type="sldImg"/>
+          </p:nvPr>
+        </p:nvSpPr>
+        <p:spPr/>
+      </p:sp>
+      <p:sp>
+        <p:nvSpPr>
+          <p:cNvPr id="3" name="Notes Placeholder 2"/>
+          <p:cNvSpPr>
+            <a:spLocks noGrp="1"/>
+          </p:cNvSpPr>
+          <p:nvPr>
+            <p:ph type="body" idx="1"/>
+          </p:nvPr>
+        </p:nvSpPr>
+        <p:spPr/>
+        <p:txBody>
+          <a:bodyPr/>
+          <a:lstStyle/>
+          <a:p>
+            <a:endParaRPr lang="en-US" dirty="0"/>
+          </a:p>
+        </p:txBody>
+      </p:sp>
+      <p:sp>
+        <p:nvSpPr>
+          <p:cNvPr id="4" name="Slide Number Placeholder 3"/>
+          <p:cNvSpPr>
+            <a:spLocks noGrp="1"/>
+          </p:cNvSpPr>
+          <p:nvPr>
+            <p:ph type="sldNum" sz="quarter" idx="10"/>
+          </p:nvPr>
+        </p:nvSpPr>
+        <p:spPr/>
+        <p:txBody>
+          <a:bodyPr/>
+          <a:lstStyle/>
+          <a:p>
+            <a:fld id="{F06D5892-0430-4AF2-93AC-99DFD0427A02}" type="slidenum">
+              <a:rPr lang="en-US" smtClean="0"/>
+              <a:t>7</a:t>
+            </a:fld>
+            <a:endParaRPr lang="en-US"/>
+          </a:p>
+        </p:txBody>
+      </p:sp>
+    </p:spTree>
+    <p:extLst>
+      <p:ext uri="{BB962C8B-B14F-4D97-AF65-F5344CB8AC3E}">
+        <p14:creationId xmlns:p14="http://schemas.microsoft.com/office/powerpoint/2010/main" val="1060954207"/>
+      </p:ext>
+    </p:extLst>
+  </p:cSld>
+  <p:clrMapOvr>
+    <a:masterClrMapping/>
+  </p:clrMapOvr>
+</p:notes>
 </file>
 
 <file path=ppt/slideLayouts/slideLayout1.xml><?xml version="1.0" encoding="utf-8"?>
@@ -3894,13 +3979,6 @@
               </a:rPr>
               <a:t>environment.</a:t>
             </a:r>
-            <a:endParaRPr lang="en-US" sz="2800" b="1" dirty="0" smtClean="0">
-              <a:solidFill>
-                <a:schemeClr val="accent5">
-                  <a:lumMod val="75000"/>
-                </a:schemeClr>
-              </a:solidFill>
-            </a:endParaRPr>
           </a:p>
           <a:p>
             <a:pPr marL="285750" indent="-285750">
@@ -8677,6 +8755,1160 @@
     <p:extLst>
       <p:ext uri="{BB962C8B-B14F-4D97-AF65-F5344CB8AC3E}">
         <p14:creationId xmlns:p14="http://schemas.microsoft.com/office/powerpoint/2010/main" val="1067540849"/>
+      </p:ext>
+    </p:extLst>
+  </p:cSld>
+  <p:clrMapOvr>
+    <a:masterClrMapping/>
+  </p:clrMapOvr>
+  <p:timing>
+    <p:tnLst>
+      <p:par>
+        <p:cTn id="1" dur="indefinite" restart="never" nodeType="tmRoot"/>
+      </p:par>
+    </p:tnLst>
+  </p:timing>
+</p:sld>
+</file>
+
+<file path=ppt/slides/slide7.xml><?xml version="1.0" encoding="utf-8"?>
+<p:sld xmlns:a="http://schemas.openxmlformats.org/drawingml/2006/main" xmlns:r="http://schemas.openxmlformats.org/officeDocument/2006/relationships" xmlns:p="http://schemas.openxmlformats.org/presentationml/2006/main">
+  <p:cSld>
+    <p:spTree>
+      <p:nvGrpSpPr>
+        <p:cNvPr id="1" name=""/>
+        <p:cNvGrpSpPr/>
+        <p:nvPr/>
+      </p:nvGrpSpPr>
+      <p:grpSpPr>
+        <a:xfrm>
+          <a:off x="0" y="0"/>
+          <a:ext cx="0" cy="0"/>
+          <a:chOff x="0" y="0"/>
+          <a:chExt cx="0" cy="0"/>
+        </a:xfrm>
+      </p:grpSpPr>
+      <p:sp>
+        <p:nvSpPr>
+          <p:cNvPr id="2" name="Title 1"/>
+          <p:cNvSpPr>
+            <a:spLocks noGrp="1"/>
+          </p:cNvSpPr>
+          <p:nvPr>
+            <p:ph type="title"/>
+          </p:nvPr>
+        </p:nvSpPr>
+        <p:spPr>
+          <a:xfrm>
+            <a:off x="200025" y="304800"/>
+            <a:ext cx="8610600" cy="792162"/>
+          </a:xfrm>
+        </p:spPr>
+        <p:txBody>
+          <a:bodyPr>
+            <a:normAutofit fontScale="90000"/>
+          </a:bodyPr>
+          <a:lstStyle/>
+          <a:p>
+            <a:pPr algn="l"/>
+            <a:r>
+              <a:rPr lang="en-US" dirty="0" smtClean="0">
+                <a:solidFill>
+                  <a:schemeClr val="accent1">
+                    <a:lumMod val="75000"/>
+                  </a:schemeClr>
+                </a:solidFill>
+              </a:rPr>
+              <a:t>Simple Reinforcement Learning Example</a:t>
+            </a:r>
+            <a:endParaRPr lang="en-US" dirty="0">
+              <a:solidFill>
+                <a:schemeClr val="accent1">
+                  <a:lumMod val="75000"/>
+                </a:schemeClr>
+              </a:solidFill>
+            </a:endParaRPr>
+          </a:p>
+        </p:txBody>
+      </p:sp>
+      <p:cxnSp>
+        <p:nvCxnSpPr>
+          <p:cNvPr id="5" name="Straight Connector 4"/>
+          <p:cNvCxnSpPr/>
+          <p:nvPr/>
+        </p:nvCxnSpPr>
+        <p:spPr>
+          <a:xfrm>
+            <a:off x="0" y="990600"/>
+            <a:ext cx="9144000" cy="0"/>
+          </a:xfrm>
+          <a:prstGeom prst="line">
+            <a:avLst/>
+          </a:prstGeom>
+          <a:ln w="19050"/>
+        </p:spPr>
+        <p:style>
+          <a:lnRef idx="1">
+            <a:schemeClr val="accent1"/>
+          </a:lnRef>
+          <a:fillRef idx="0">
+            <a:schemeClr val="accent1"/>
+          </a:fillRef>
+          <a:effectRef idx="0">
+            <a:schemeClr val="accent1"/>
+          </a:effectRef>
+          <a:fontRef idx="minor">
+            <a:schemeClr val="tx1"/>
+          </a:fontRef>
+        </p:style>
+      </p:cxnSp>
+      <p:pic>
+        <p:nvPicPr>
+          <p:cNvPr id="34" name="Picture 2" descr="Related image"/>
+          <p:cNvPicPr>
+            <a:picLocks noChangeAspect="1" noChangeArrowheads="1"/>
+          </p:cNvPicPr>
+          <p:nvPr/>
+        </p:nvPicPr>
+        <p:blipFill>
+          <a:blip r:embed="rId3" cstate="print">
+            <a:extLst>
+              <a:ext uri="{28A0092B-C50C-407E-A947-70E740481C1C}">
+                <a14:useLocalDpi xmlns:a14="http://schemas.microsoft.com/office/drawing/2010/main" val="0"/>
+              </a:ext>
+            </a:extLst>
+          </a:blip>
+          <a:srcRect/>
+          <a:stretch>
+            <a:fillRect/>
+          </a:stretch>
+        </p:blipFill>
+        <p:spPr bwMode="auto">
+          <a:xfrm>
+            <a:off x="716769" y="2055911"/>
+            <a:ext cx="842423" cy="1190625"/>
+          </a:xfrm>
+          <a:prstGeom prst="rect">
+            <a:avLst/>
+          </a:prstGeom>
+          <a:noFill/>
+          <a:extLst>
+            <a:ext uri="{909E8E84-426E-40DD-AFC4-6F175D3DCCD1}">
+              <a14:hiddenFill xmlns:a14="http://schemas.microsoft.com/office/drawing/2010/main">
+                <a:solidFill>
+                  <a:srgbClr val="FFFFFF"/>
+                </a:solidFill>
+              </a14:hiddenFill>
+            </a:ext>
+          </a:extLst>
+        </p:spPr>
+      </p:pic>
+      <p:sp>
+        <p:nvSpPr>
+          <p:cNvPr id="3" name="Folded Corner 2"/>
+          <p:cNvSpPr/>
+          <p:nvPr/>
+        </p:nvSpPr>
+        <p:spPr>
+          <a:xfrm>
+            <a:off x="533400" y="3503711"/>
+            <a:ext cx="1295400" cy="1068289"/>
+          </a:xfrm>
+          <a:prstGeom prst="foldedCorner">
+            <a:avLst/>
+          </a:prstGeom>
+          <a:noFill/>
+          <a:ln>
+            <a:solidFill>
+              <a:schemeClr val="accent6">
+                <a:lumMod val="75000"/>
+              </a:schemeClr>
+            </a:solidFill>
+          </a:ln>
+        </p:spPr>
+        <p:style>
+          <a:lnRef idx="2">
+            <a:schemeClr val="accent1">
+              <a:shade val="50000"/>
+            </a:schemeClr>
+          </a:lnRef>
+          <a:fillRef idx="1">
+            <a:schemeClr val="accent1"/>
+          </a:fillRef>
+          <a:effectRef idx="0">
+            <a:schemeClr val="accent1"/>
+          </a:effectRef>
+          <a:fontRef idx="minor">
+            <a:schemeClr val="lt1"/>
+          </a:fontRef>
+        </p:style>
+        <p:txBody>
+          <a:bodyPr rtlCol="0" anchor="ctr"/>
+          <a:lstStyle/>
+          <a:p>
+            <a:pPr algn="ctr"/>
+            <a:r>
+              <a:rPr lang="en-US" sz="1400" b="1" dirty="0" smtClean="0">
+                <a:solidFill>
+                  <a:schemeClr val="accent6">
+                    <a:lumMod val="75000"/>
+                  </a:schemeClr>
+                </a:solidFill>
+              </a:rPr>
+              <a:t>Actions:</a:t>
+            </a:r>
+            <a:br>
+              <a:rPr lang="en-US" sz="1400" b="1" dirty="0" smtClean="0">
+                <a:solidFill>
+                  <a:schemeClr val="accent6">
+                    <a:lumMod val="75000"/>
+                  </a:schemeClr>
+                </a:solidFill>
+              </a:rPr>
+            </a:br>
+            <a:r>
+              <a:rPr lang="en-US" sz="1400" b="1" dirty="0" smtClean="0">
+                <a:solidFill>
+                  <a:schemeClr val="accent6">
+                    <a:lumMod val="75000"/>
+                  </a:schemeClr>
+                </a:solidFill>
+              </a:rPr>
+              <a:t>Stand</a:t>
+            </a:r>
+            <a:br>
+              <a:rPr lang="en-US" sz="1400" b="1" dirty="0" smtClean="0">
+                <a:solidFill>
+                  <a:schemeClr val="accent6">
+                    <a:lumMod val="75000"/>
+                  </a:schemeClr>
+                </a:solidFill>
+              </a:rPr>
+            </a:br>
+            <a:r>
+              <a:rPr lang="en-US" sz="1400" b="1" dirty="0" smtClean="0">
+                <a:solidFill>
+                  <a:schemeClr val="accent6">
+                    <a:lumMod val="75000"/>
+                  </a:schemeClr>
+                </a:solidFill>
+              </a:rPr>
+              <a:t>Walk</a:t>
+            </a:r>
+          </a:p>
+          <a:p>
+            <a:pPr algn="ctr"/>
+            <a:r>
+              <a:rPr lang="en-US" sz="1400" b="1" dirty="0" smtClean="0">
+                <a:solidFill>
+                  <a:schemeClr val="accent6">
+                    <a:lumMod val="75000"/>
+                  </a:schemeClr>
+                </a:solidFill>
+              </a:rPr>
+              <a:t>Run</a:t>
+            </a:r>
+            <a:endParaRPr lang="en-US" sz="1400" b="1" dirty="0">
+              <a:solidFill>
+                <a:schemeClr val="accent6">
+                  <a:lumMod val="75000"/>
+                </a:schemeClr>
+              </a:solidFill>
+            </a:endParaRPr>
+          </a:p>
+        </p:txBody>
+      </p:sp>
+      <p:sp>
+        <p:nvSpPr>
+          <p:cNvPr id="21" name="Folded Corner 20"/>
+          <p:cNvSpPr/>
+          <p:nvPr/>
+        </p:nvSpPr>
+        <p:spPr>
+          <a:xfrm>
+            <a:off x="533400" y="4645222"/>
+            <a:ext cx="1295400" cy="1298378"/>
+          </a:xfrm>
+          <a:prstGeom prst="foldedCorner">
+            <a:avLst/>
+          </a:prstGeom>
+          <a:noFill/>
+          <a:ln>
+            <a:solidFill>
+              <a:schemeClr val="accent6">
+                <a:lumMod val="75000"/>
+              </a:schemeClr>
+            </a:solidFill>
+          </a:ln>
+        </p:spPr>
+        <p:style>
+          <a:lnRef idx="2">
+            <a:schemeClr val="accent1">
+              <a:shade val="50000"/>
+            </a:schemeClr>
+          </a:lnRef>
+          <a:fillRef idx="1">
+            <a:schemeClr val="accent1"/>
+          </a:fillRef>
+          <a:effectRef idx="0">
+            <a:schemeClr val="accent1"/>
+          </a:effectRef>
+          <a:fontRef idx="minor">
+            <a:schemeClr val="lt1"/>
+          </a:fontRef>
+        </p:style>
+        <p:txBody>
+          <a:bodyPr rtlCol="0" anchor="ctr"/>
+          <a:lstStyle/>
+          <a:p>
+            <a:pPr algn="ctr"/>
+            <a:r>
+              <a:rPr lang="en-US" sz="1400" b="1" dirty="0" smtClean="0">
+                <a:solidFill>
+                  <a:schemeClr val="accent6">
+                    <a:lumMod val="75000"/>
+                  </a:schemeClr>
+                </a:solidFill>
+              </a:rPr>
+              <a:t>Rewards:</a:t>
+            </a:r>
+            <a:br>
+              <a:rPr lang="en-US" sz="1400" b="1" dirty="0" smtClean="0">
+                <a:solidFill>
+                  <a:schemeClr val="accent6">
+                    <a:lumMod val="75000"/>
+                  </a:schemeClr>
+                </a:solidFill>
+              </a:rPr>
+            </a:br>
+            <a:r>
+              <a:rPr lang="en-US" sz="1400" b="1" dirty="0" smtClean="0">
+                <a:solidFill>
+                  <a:schemeClr val="accent6">
+                    <a:lumMod val="75000"/>
+                  </a:schemeClr>
+                </a:solidFill>
+              </a:rPr>
+              <a:t>Stand -&gt; 0</a:t>
+            </a:r>
+            <a:br>
+              <a:rPr lang="en-US" sz="1400" b="1" dirty="0" smtClean="0">
+                <a:solidFill>
+                  <a:schemeClr val="accent6">
+                    <a:lumMod val="75000"/>
+                  </a:schemeClr>
+                </a:solidFill>
+              </a:rPr>
+            </a:br>
+            <a:r>
+              <a:rPr lang="en-US" sz="1400" b="1" dirty="0" smtClean="0">
+                <a:solidFill>
+                  <a:schemeClr val="accent6">
+                    <a:lumMod val="75000"/>
+                  </a:schemeClr>
+                </a:solidFill>
+              </a:rPr>
+              <a:t>Walk  -&gt; 1</a:t>
+            </a:r>
+          </a:p>
+          <a:p>
+            <a:pPr algn="ctr"/>
+            <a:r>
+              <a:rPr lang="en-US" sz="1400" b="1" dirty="0" smtClean="0">
+                <a:solidFill>
+                  <a:schemeClr val="accent6">
+                    <a:lumMod val="75000"/>
+                  </a:schemeClr>
+                </a:solidFill>
+              </a:rPr>
+              <a:t>Run    -&gt; 2</a:t>
+            </a:r>
+          </a:p>
+          <a:p>
+            <a:pPr algn="ctr"/>
+            <a:r>
+              <a:rPr lang="en-US" sz="1400" b="1" dirty="0" smtClean="0">
+                <a:solidFill>
+                  <a:schemeClr val="accent6">
+                    <a:lumMod val="75000"/>
+                  </a:schemeClr>
+                </a:solidFill>
+              </a:rPr>
+              <a:t>Fal</a:t>
+            </a:r>
+            <a:r>
+              <a:rPr lang="en-US" sz="1400" b="1" dirty="0" smtClean="0">
+                <a:solidFill>
+                  <a:schemeClr val="accent6">
+                    <a:lumMod val="75000"/>
+                  </a:schemeClr>
+                </a:solidFill>
+              </a:rPr>
+              <a:t>l   -&gt; -2</a:t>
+            </a:r>
+            <a:endParaRPr lang="en-US" sz="1400" b="1" dirty="0">
+              <a:solidFill>
+                <a:schemeClr val="accent6">
+                  <a:lumMod val="75000"/>
+                </a:schemeClr>
+              </a:solidFill>
+            </a:endParaRPr>
+          </a:p>
+        </p:txBody>
+      </p:sp>
+      <p:sp>
+        <p:nvSpPr>
+          <p:cNvPr id="22" name="TextBox 21"/>
+          <p:cNvSpPr txBox="1"/>
+          <p:nvPr/>
+        </p:nvSpPr>
+        <p:spPr>
+          <a:xfrm>
+            <a:off x="377574" y="1757658"/>
+            <a:ext cx="1417632" cy="307777"/>
+          </a:xfrm>
+          <a:prstGeom prst="rect">
+            <a:avLst/>
+          </a:prstGeom>
+          <a:noFill/>
+        </p:spPr>
+        <p:txBody>
+          <a:bodyPr wrap="none" rtlCol="0">
+            <a:spAutoFit/>
+          </a:bodyPr>
+          <a:lstStyle/>
+          <a:p>
+            <a:r>
+              <a:rPr lang="en-US" sz="1400" b="1" dirty="0" smtClean="0"/>
+              <a:t>Un-programmed</a:t>
+            </a:r>
+            <a:endParaRPr lang="en-US" sz="1400" b="1" dirty="0"/>
+          </a:p>
+        </p:txBody>
+      </p:sp>
+      <p:sp>
+        <p:nvSpPr>
+          <p:cNvPr id="23" name="Rectangle 22"/>
+          <p:cNvSpPr/>
+          <p:nvPr/>
+        </p:nvSpPr>
+        <p:spPr>
+          <a:xfrm>
+            <a:off x="228600" y="1598711"/>
+            <a:ext cx="1905000" cy="4497289"/>
+          </a:xfrm>
+          <a:prstGeom prst="rect">
+            <a:avLst/>
+          </a:prstGeom>
+          <a:noFill/>
+          <a:ln>
+            <a:solidFill>
+              <a:schemeClr val="bg1">
+                <a:lumMod val="50000"/>
+              </a:schemeClr>
+            </a:solidFill>
+            <a:prstDash val="dash"/>
+          </a:ln>
+        </p:spPr>
+        <p:style>
+          <a:lnRef idx="2">
+            <a:schemeClr val="accent1">
+              <a:shade val="50000"/>
+            </a:schemeClr>
+          </a:lnRef>
+          <a:fillRef idx="1">
+            <a:schemeClr val="accent1"/>
+          </a:fillRef>
+          <a:effectRef idx="0">
+            <a:schemeClr val="accent1"/>
+          </a:effectRef>
+          <a:fontRef idx="minor">
+            <a:schemeClr val="lt1"/>
+          </a:fontRef>
+        </p:style>
+        <p:txBody>
+          <a:bodyPr rtlCol="0" anchor="ctr"/>
+          <a:lstStyle/>
+          <a:p>
+            <a:pPr algn="ctr"/>
+            <a:endParaRPr lang="en-US"/>
+          </a:p>
+        </p:txBody>
+      </p:sp>
+      <p:sp>
+        <p:nvSpPr>
+          <p:cNvPr id="7" name="TextBox 6"/>
+          <p:cNvSpPr txBox="1"/>
+          <p:nvPr/>
+        </p:nvSpPr>
+        <p:spPr>
+          <a:xfrm>
+            <a:off x="2743200" y="1598711"/>
+            <a:ext cx="5812040" cy="3108543"/>
+          </a:xfrm>
+          <a:prstGeom prst="rect">
+            <a:avLst/>
+          </a:prstGeom>
+          <a:noFill/>
+        </p:spPr>
+        <p:txBody>
+          <a:bodyPr wrap="none" rtlCol="0">
+            <a:spAutoFit/>
+          </a:bodyPr>
+          <a:lstStyle/>
+          <a:p>
+            <a:r>
+              <a:rPr lang="en-US" sz="1400" b="1" dirty="0" smtClean="0">
+                <a:solidFill>
+                  <a:schemeClr val="accent6">
+                    <a:lumMod val="75000"/>
+                  </a:schemeClr>
+                </a:solidFill>
+              </a:rPr>
+              <a:t>Initial State -&gt; Fall				State-&gt;Action</a:t>
+            </a:r>
+          </a:p>
+          <a:p>
+            <a:r>
+              <a:rPr lang="en-US" sz="1400" b="1" dirty="0" smtClean="0">
+                <a:solidFill>
+                  <a:schemeClr val="accent6">
+                    <a:lumMod val="75000"/>
+                  </a:schemeClr>
+                </a:solidFill>
+              </a:rPr>
+              <a:t>Actions:	</a:t>
+            </a:r>
+            <a:r>
+              <a:rPr lang="en-US" sz="1400" b="1" dirty="0" smtClean="0">
+                <a:solidFill>
+                  <a:srgbClr val="00B050"/>
+                </a:solidFill>
+              </a:rPr>
+              <a:t>Stand -&gt; 0				Fall -&gt; Stand</a:t>
+            </a:r>
+          </a:p>
+          <a:p>
+            <a:r>
+              <a:rPr lang="en-US" sz="1400" b="1" dirty="0">
+                <a:solidFill>
+                  <a:schemeClr val="accent6">
+                    <a:lumMod val="75000"/>
+                  </a:schemeClr>
+                </a:solidFill>
+              </a:rPr>
+              <a:t>	</a:t>
+            </a:r>
+            <a:r>
+              <a:rPr lang="en-US" sz="1400" b="1" dirty="0" smtClean="0">
+                <a:solidFill>
+                  <a:schemeClr val="accent6">
+                    <a:lumMod val="75000"/>
+                  </a:schemeClr>
+                </a:solidFill>
+              </a:rPr>
+              <a:t>Walk  -&gt; </a:t>
+            </a:r>
+            <a:r>
+              <a:rPr lang="en-US" sz="1400" b="1" dirty="0" smtClean="0">
+                <a:solidFill>
+                  <a:srgbClr val="FF0000"/>
+                </a:solidFill>
+              </a:rPr>
+              <a:t>Robot</a:t>
+            </a:r>
+            <a:r>
+              <a:rPr lang="en-US" sz="1400" b="1" dirty="0" smtClean="0">
+                <a:solidFill>
+                  <a:schemeClr val="accent6">
+                    <a:lumMod val="75000"/>
+                  </a:schemeClr>
+                </a:solidFill>
+              </a:rPr>
+              <a:t> </a:t>
+            </a:r>
+            <a:r>
+              <a:rPr lang="en-US" sz="1400" b="1" dirty="0" smtClean="0">
+                <a:solidFill>
+                  <a:srgbClr val="FF0000"/>
+                </a:solidFill>
+              </a:rPr>
+              <a:t>Falls Down </a:t>
+            </a:r>
+            <a:r>
+              <a:rPr lang="en-US" sz="1400" b="1" dirty="0" smtClean="0">
+                <a:solidFill>
+                  <a:schemeClr val="accent6">
+                    <a:lumMod val="75000"/>
+                  </a:schemeClr>
+                </a:solidFill>
+              </a:rPr>
+              <a:t>-&gt; -2</a:t>
+            </a:r>
+          </a:p>
+          <a:p>
+            <a:r>
+              <a:rPr lang="en-US" sz="1400" b="1" dirty="0">
+                <a:solidFill>
+                  <a:schemeClr val="accent6">
+                    <a:lumMod val="75000"/>
+                  </a:schemeClr>
+                </a:solidFill>
+              </a:rPr>
+              <a:t>	</a:t>
+            </a:r>
+            <a:r>
+              <a:rPr lang="en-US" sz="1400" b="1" dirty="0" smtClean="0">
+                <a:solidFill>
+                  <a:schemeClr val="accent6">
+                    <a:lumMod val="75000"/>
+                  </a:schemeClr>
+                </a:solidFill>
+              </a:rPr>
+              <a:t>Run    -&gt; </a:t>
+            </a:r>
+            <a:r>
+              <a:rPr lang="en-US" sz="1400" b="1" dirty="0" smtClean="0">
+                <a:solidFill>
+                  <a:srgbClr val="FF0000"/>
+                </a:solidFill>
+              </a:rPr>
+              <a:t>Robot</a:t>
+            </a:r>
+            <a:r>
+              <a:rPr lang="en-US" sz="1400" b="1" dirty="0" smtClean="0">
+                <a:solidFill>
+                  <a:schemeClr val="accent6">
+                    <a:lumMod val="75000"/>
+                  </a:schemeClr>
+                </a:solidFill>
+              </a:rPr>
+              <a:t> </a:t>
+            </a:r>
+            <a:r>
+              <a:rPr lang="en-US" sz="1400" b="1" dirty="0" smtClean="0">
+                <a:solidFill>
+                  <a:srgbClr val="FF0000"/>
+                </a:solidFill>
+              </a:rPr>
+              <a:t>Falls Down </a:t>
+            </a:r>
+            <a:r>
+              <a:rPr lang="en-US" sz="1400" b="1" dirty="0" smtClean="0">
+                <a:solidFill>
+                  <a:schemeClr val="accent6">
+                    <a:lumMod val="75000"/>
+                  </a:schemeClr>
+                </a:solidFill>
+              </a:rPr>
+              <a:t>-&gt; -2</a:t>
+            </a:r>
+          </a:p>
+          <a:p>
+            <a:endParaRPr lang="en-US" sz="1400" b="1" dirty="0">
+              <a:solidFill>
+                <a:schemeClr val="accent6">
+                  <a:lumMod val="75000"/>
+                </a:schemeClr>
+              </a:solidFill>
+            </a:endParaRPr>
+          </a:p>
+          <a:p>
+            <a:r>
+              <a:rPr lang="en-US" sz="1400" b="1" dirty="0" smtClean="0">
+                <a:solidFill>
+                  <a:schemeClr val="accent6">
+                    <a:lumMod val="75000"/>
+                  </a:schemeClr>
+                </a:solidFill>
+              </a:rPr>
+              <a:t>State-&gt;Stand</a:t>
+            </a:r>
+          </a:p>
+          <a:p>
+            <a:r>
+              <a:rPr lang="en-US" sz="1400" b="1" dirty="0">
+                <a:solidFill>
+                  <a:schemeClr val="accent6">
+                    <a:lumMod val="75000"/>
+                  </a:schemeClr>
+                </a:solidFill>
+              </a:rPr>
+              <a:t>	</a:t>
+            </a:r>
+            <a:r>
+              <a:rPr lang="en-US" sz="1400" b="1" dirty="0" smtClean="0">
+                <a:solidFill>
+                  <a:schemeClr val="accent6">
+                    <a:lumMod val="75000"/>
+                  </a:schemeClr>
+                </a:solidFill>
+              </a:rPr>
+              <a:t>Stand -&gt; 0</a:t>
+            </a:r>
+          </a:p>
+          <a:p>
+            <a:r>
+              <a:rPr lang="en-US" sz="1400" b="1" dirty="0">
+                <a:solidFill>
+                  <a:schemeClr val="accent6">
+                    <a:lumMod val="75000"/>
+                  </a:schemeClr>
+                </a:solidFill>
+              </a:rPr>
+              <a:t>	</a:t>
+            </a:r>
+            <a:r>
+              <a:rPr lang="en-US" sz="1400" b="1" dirty="0" smtClean="0">
+                <a:solidFill>
+                  <a:srgbClr val="00B050"/>
+                </a:solidFill>
+              </a:rPr>
+              <a:t>Walk  -&gt; 1				Stand-&gt;Walk</a:t>
+            </a:r>
+          </a:p>
+          <a:p>
+            <a:r>
+              <a:rPr lang="en-US" sz="1400" b="1" dirty="0" smtClean="0">
+                <a:solidFill>
+                  <a:schemeClr val="accent6">
+                    <a:lumMod val="75000"/>
+                  </a:schemeClr>
+                </a:solidFill>
+              </a:rPr>
+              <a:t>	Run    </a:t>
+            </a:r>
+            <a:r>
+              <a:rPr lang="en-US" sz="1400" b="1" dirty="0">
+                <a:solidFill>
+                  <a:schemeClr val="accent6">
+                    <a:lumMod val="75000"/>
+                  </a:schemeClr>
+                </a:solidFill>
+              </a:rPr>
+              <a:t>-&gt; </a:t>
+            </a:r>
+            <a:r>
+              <a:rPr lang="en-US" sz="1400" b="1" dirty="0">
+                <a:solidFill>
+                  <a:srgbClr val="FF0000"/>
+                </a:solidFill>
+              </a:rPr>
+              <a:t>Robot</a:t>
+            </a:r>
+            <a:r>
+              <a:rPr lang="en-US" sz="1400" b="1" dirty="0">
+                <a:solidFill>
+                  <a:schemeClr val="accent6">
+                    <a:lumMod val="75000"/>
+                  </a:schemeClr>
+                </a:solidFill>
+              </a:rPr>
+              <a:t> </a:t>
+            </a:r>
+            <a:r>
+              <a:rPr lang="en-US" sz="1400" b="1" dirty="0">
+                <a:solidFill>
+                  <a:srgbClr val="FF0000"/>
+                </a:solidFill>
+              </a:rPr>
+              <a:t>Falls Down </a:t>
+            </a:r>
+            <a:r>
+              <a:rPr lang="en-US" sz="1400" b="1" dirty="0">
+                <a:solidFill>
+                  <a:schemeClr val="accent6">
+                    <a:lumMod val="75000"/>
+                  </a:schemeClr>
+                </a:solidFill>
+              </a:rPr>
+              <a:t>-&gt; -</a:t>
+            </a:r>
+            <a:r>
+              <a:rPr lang="en-US" sz="1400" b="1" dirty="0" smtClean="0">
+                <a:solidFill>
+                  <a:schemeClr val="accent6">
+                    <a:lumMod val="75000"/>
+                  </a:schemeClr>
+                </a:solidFill>
+              </a:rPr>
+              <a:t>2</a:t>
+            </a:r>
+          </a:p>
+          <a:p>
+            <a:endParaRPr lang="en-US" sz="1400" b="1" dirty="0">
+              <a:solidFill>
+                <a:schemeClr val="accent6">
+                  <a:lumMod val="75000"/>
+                </a:schemeClr>
+              </a:solidFill>
+            </a:endParaRPr>
+          </a:p>
+          <a:p>
+            <a:r>
+              <a:rPr lang="en-US" sz="1400" b="1" dirty="0" smtClean="0">
+                <a:solidFill>
+                  <a:schemeClr val="accent6">
+                    <a:lumMod val="75000"/>
+                  </a:schemeClr>
+                </a:solidFill>
+              </a:rPr>
+              <a:t>State-&gt;Walk</a:t>
+            </a:r>
+          </a:p>
+          <a:p>
+            <a:r>
+              <a:rPr lang="en-US" sz="1400" b="1" dirty="0">
+                <a:solidFill>
+                  <a:schemeClr val="accent6">
+                    <a:lumMod val="75000"/>
+                  </a:schemeClr>
+                </a:solidFill>
+              </a:rPr>
+              <a:t>	</a:t>
+            </a:r>
+            <a:r>
+              <a:rPr lang="en-US" sz="1400" b="1" dirty="0" smtClean="0">
+                <a:solidFill>
+                  <a:schemeClr val="accent6">
+                    <a:lumMod val="75000"/>
+                  </a:schemeClr>
+                </a:solidFill>
+              </a:rPr>
+              <a:t>Stand -&gt; 0</a:t>
+            </a:r>
+          </a:p>
+          <a:p>
+            <a:r>
+              <a:rPr lang="en-US" sz="1400" b="1" dirty="0">
+                <a:solidFill>
+                  <a:schemeClr val="accent6">
+                    <a:lumMod val="75000"/>
+                  </a:schemeClr>
+                </a:solidFill>
+              </a:rPr>
+              <a:t>	</a:t>
+            </a:r>
+            <a:r>
+              <a:rPr lang="en-US" sz="1400" b="1" dirty="0" smtClean="0">
+                <a:solidFill>
+                  <a:schemeClr val="accent6">
+                    <a:lumMod val="75000"/>
+                  </a:schemeClr>
+                </a:solidFill>
+              </a:rPr>
+              <a:t>Walk  -&gt; 1</a:t>
+            </a:r>
+          </a:p>
+          <a:p>
+            <a:r>
+              <a:rPr lang="en-US" sz="1400" b="1" dirty="0">
+                <a:solidFill>
+                  <a:schemeClr val="accent6">
+                    <a:lumMod val="75000"/>
+                  </a:schemeClr>
+                </a:solidFill>
+              </a:rPr>
+              <a:t>	</a:t>
+            </a:r>
+            <a:r>
+              <a:rPr lang="en-US" sz="1400" b="1" dirty="0" smtClean="0">
+                <a:solidFill>
+                  <a:srgbClr val="00B050"/>
+                </a:solidFill>
+              </a:rPr>
+              <a:t>Run    -&gt; 2				Walk-&gt;Run</a:t>
+            </a:r>
+            <a:endParaRPr lang="en-US" sz="1400" b="1" dirty="0">
+              <a:solidFill>
+                <a:srgbClr val="00B050"/>
+              </a:solidFill>
+            </a:endParaRPr>
+          </a:p>
+        </p:txBody>
+      </p:sp>
+      <p:sp>
+        <p:nvSpPr>
+          <p:cNvPr id="8" name="Right Arrow 7"/>
+          <p:cNvSpPr/>
+          <p:nvPr/>
+        </p:nvSpPr>
+        <p:spPr>
+          <a:xfrm>
+            <a:off x="4657724" y="1958095"/>
+            <a:ext cx="2581275" cy="45719"/>
+          </a:xfrm>
+          <a:prstGeom prst="rightArrow">
+            <a:avLst/>
+          </a:prstGeom>
+          <a:solidFill>
+            <a:srgbClr val="00B050"/>
+          </a:solidFill>
+          <a:ln>
+            <a:solidFill>
+              <a:srgbClr val="00B050"/>
+            </a:solidFill>
+          </a:ln>
+        </p:spPr>
+        <p:style>
+          <a:lnRef idx="2">
+            <a:schemeClr val="accent1">
+              <a:shade val="50000"/>
+            </a:schemeClr>
+          </a:lnRef>
+          <a:fillRef idx="1">
+            <a:schemeClr val="accent1"/>
+          </a:fillRef>
+          <a:effectRef idx="0">
+            <a:schemeClr val="accent1"/>
+          </a:effectRef>
+          <a:fontRef idx="minor">
+            <a:schemeClr val="lt1"/>
+          </a:fontRef>
+        </p:style>
+        <p:txBody>
+          <a:bodyPr rtlCol="0" anchor="ctr"/>
+          <a:lstStyle/>
+          <a:p>
+            <a:pPr algn="ctr"/>
+            <a:endParaRPr lang="en-US"/>
+          </a:p>
+        </p:txBody>
+      </p:sp>
+      <p:sp>
+        <p:nvSpPr>
+          <p:cNvPr id="26" name="TextBox 25"/>
+          <p:cNvSpPr txBox="1"/>
+          <p:nvPr/>
+        </p:nvSpPr>
+        <p:spPr>
+          <a:xfrm>
+            <a:off x="7338012" y="1318020"/>
+            <a:ext cx="1263808" cy="307777"/>
+          </a:xfrm>
+          <a:prstGeom prst="rect">
+            <a:avLst/>
+          </a:prstGeom>
+          <a:noFill/>
+        </p:spPr>
+        <p:txBody>
+          <a:bodyPr wrap="none" rtlCol="0">
+            <a:spAutoFit/>
+          </a:bodyPr>
+          <a:lstStyle/>
+          <a:p>
+            <a:r>
+              <a:rPr lang="en-US" sz="1400" b="1" dirty="0" smtClean="0"/>
+              <a:t>Learned Policy</a:t>
+            </a:r>
+            <a:endParaRPr lang="en-US" sz="1400" b="1" dirty="0"/>
+          </a:p>
+        </p:txBody>
+      </p:sp>
+      <p:sp>
+        <p:nvSpPr>
+          <p:cNvPr id="27" name="TextBox 26"/>
+          <p:cNvSpPr txBox="1"/>
+          <p:nvPr/>
+        </p:nvSpPr>
+        <p:spPr>
+          <a:xfrm>
+            <a:off x="2895600" y="1286467"/>
+            <a:ext cx="577787" cy="307777"/>
+          </a:xfrm>
+          <a:prstGeom prst="rect">
+            <a:avLst/>
+          </a:prstGeom>
+          <a:noFill/>
+        </p:spPr>
+        <p:txBody>
+          <a:bodyPr wrap="none" rtlCol="0">
+            <a:spAutoFit/>
+          </a:bodyPr>
+          <a:lstStyle/>
+          <a:p>
+            <a:r>
+              <a:rPr lang="en-US" sz="1400" b="1" dirty="0" smtClean="0"/>
+              <a:t>Trials</a:t>
+            </a:r>
+            <a:endParaRPr lang="en-US" sz="1400" b="1" dirty="0"/>
+          </a:p>
+        </p:txBody>
+      </p:sp>
+      <p:sp>
+        <p:nvSpPr>
+          <p:cNvPr id="29" name="Right Arrow 28"/>
+          <p:cNvSpPr/>
+          <p:nvPr/>
+        </p:nvSpPr>
+        <p:spPr>
+          <a:xfrm>
+            <a:off x="4667249" y="3191046"/>
+            <a:ext cx="2581275" cy="45719"/>
+          </a:xfrm>
+          <a:prstGeom prst="rightArrow">
+            <a:avLst/>
+          </a:prstGeom>
+          <a:solidFill>
+            <a:srgbClr val="00B050"/>
+          </a:solidFill>
+          <a:ln>
+            <a:solidFill>
+              <a:srgbClr val="00B050"/>
+            </a:solidFill>
+          </a:ln>
+        </p:spPr>
+        <p:style>
+          <a:lnRef idx="2">
+            <a:schemeClr val="accent1">
+              <a:shade val="50000"/>
+            </a:schemeClr>
+          </a:lnRef>
+          <a:fillRef idx="1">
+            <a:schemeClr val="accent1"/>
+          </a:fillRef>
+          <a:effectRef idx="0">
+            <a:schemeClr val="accent1"/>
+          </a:effectRef>
+          <a:fontRef idx="minor">
+            <a:schemeClr val="lt1"/>
+          </a:fontRef>
+        </p:style>
+        <p:txBody>
+          <a:bodyPr rtlCol="0" anchor="ctr"/>
+          <a:lstStyle/>
+          <a:p>
+            <a:pPr algn="ctr"/>
+            <a:endParaRPr lang="en-US"/>
+          </a:p>
+        </p:txBody>
+      </p:sp>
+      <p:sp>
+        <p:nvSpPr>
+          <p:cNvPr id="30" name="Right Arrow 29"/>
+          <p:cNvSpPr/>
+          <p:nvPr/>
+        </p:nvSpPr>
+        <p:spPr>
+          <a:xfrm>
+            <a:off x="4638674" y="4516927"/>
+            <a:ext cx="2581275" cy="45719"/>
+          </a:xfrm>
+          <a:prstGeom prst="rightArrow">
+            <a:avLst/>
+          </a:prstGeom>
+          <a:solidFill>
+            <a:srgbClr val="00B050"/>
+          </a:solidFill>
+          <a:ln>
+            <a:solidFill>
+              <a:srgbClr val="00B050"/>
+            </a:solidFill>
+          </a:ln>
+        </p:spPr>
+        <p:style>
+          <a:lnRef idx="2">
+            <a:schemeClr val="accent1">
+              <a:shade val="50000"/>
+            </a:schemeClr>
+          </a:lnRef>
+          <a:fillRef idx="1">
+            <a:schemeClr val="accent1"/>
+          </a:fillRef>
+          <a:effectRef idx="0">
+            <a:schemeClr val="accent1"/>
+          </a:effectRef>
+          <a:fontRef idx="minor">
+            <a:schemeClr val="lt1"/>
+          </a:fontRef>
+        </p:style>
+        <p:txBody>
+          <a:bodyPr rtlCol="0" anchor="ctr"/>
+          <a:lstStyle/>
+          <a:p>
+            <a:pPr algn="ctr"/>
+            <a:endParaRPr lang="en-US"/>
+          </a:p>
+        </p:txBody>
+      </p:sp>
+      <p:sp>
+        <p:nvSpPr>
+          <p:cNvPr id="9" name="TextBox 8"/>
+          <p:cNvSpPr txBox="1"/>
+          <p:nvPr/>
+        </p:nvSpPr>
+        <p:spPr>
+          <a:xfrm>
+            <a:off x="3048000" y="5294410"/>
+            <a:ext cx="1161472" cy="276999"/>
+          </a:xfrm>
+          <a:prstGeom prst="rect">
+            <a:avLst/>
+          </a:prstGeom>
+          <a:noFill/>
+        </p:spPr>
+        <p:txBody>
+          <a:bodyPr wrap="none" rtlCol="0">
+            <a:spAutoFit/>
+          </a:bodyPr>
+          <a:lstStyle/>
+          <a:p>
+            <a:r>
+              <a:rPr lang="en-US" sz="1200" dirty="0" smtClean="0">
+                <a:solidFill>
+                  <a:srgbClr val="00B050"/>
+                </a:solidFill>
+              </a:rPr>
+              <a:t>Highest Reward</a:t>
+            </a:r>
+            <a:endParaRPr lang="en-US" sz="1200" dirty="0">
+              <a:solidFill>
+                <a:srgbClr val="00B050"/>
+              </a:solidFill>
+            </a:endParaRPr>
+          </a:p>
+        </p:txBody>
+      </p:sp>
+      <p:cxnSp>
+        <p:nvCxnSpPr>
+          <p:cNvPr id="32" name="Curved Connector 31"/>
+          <p:cNvCxnSpPr/>
+          <p:nvPr/>
+        </p:nvCxnSpPr>
+        <p:spPr>
+          <a:xfrm rot="5400000" flipH="1" flipV="1">
+            <a:off x="3644073" y="4868333"/>
+            <a:ext cx="555605" cy="233449"/>
+          </a:xfrm>
+          <a:prstGeom prst="curvedConnector3">
+            <a:avLst/>
+          </a:prstGeom>
+          <a:ln>
+            <a:solidFill>
+              <a:srgbClr val="00B050"/>
+            </a:solidFill>
+            <a:tailEnd type="arrow"/>
+          </a:ln>
+        </p:spPr>
+        <p:style>
+          <a:lnRef idx="1">
+            <a:schemeClr val="accent1"/>
+          </a:lnRef>
+          <a:fillRef idx="0">
+            <a:schemeClr val="accent1"/>
+          </a:fillRef>
+          <a:effectRef idx="0">
+            <a:schemeClr val="accent1"/>
+          </a:effectRef>
+          <a:fontRef idx="minor">
+            <a:schemeClr val="tx1"/>
+          </a:fontRef>
+        </p:style>
+      </p:cxnSp>
+    </p:spTree>
+    <p:extLst>
+      <p:ext uri="{BB962C8B-B14F-4D97-AF65-F5344CB8AC3E}">
+        <p14:creationId xmlns:p14="http://schemas.microsoft.com/office/powerpoint/2010/main" val="305301905"/>
       </p:ext>
     </p:extLst>
   </p:cSld>

</xml_diff>